<commit_message>
Added the program gantt chart.
</commit_message>
<xml_diff>
--- a/doc/SingtelIOT_Progress_24_05_2019_LiuYuancheng.pptx
+++ b/doc/SingtelIOT_Progress_24_05_2019_LiuYuancheng.pptx
@@ -110,6 +110,11 @@
       </a:defRPr>
     </a:lvl9pPr>
   </p:defaultTextStyle>
+  <p:extLst>
+    <p:ext uri="{EFAFB233-063F-42B5-8137-9DF3F51BA10A}">
+      <p15:sldGuideLst xmlns:p15="http://schemas.microsoft.com/office/powerpoint/2012/main"/>
+    </p:ext>
+  </p:extLst>
 </p:presentation>
 </file>
 
@@ -879,17 +884,14 @@
             <a:rPr lang="en-US" sz="1400" b="1" dirty="0" smtClean="0"/>
             <a:t>Week8</a:t>
           </a:r>
-          <a:r>
-            <a:rPr lang="en-US" sz="1400" b="1" dirty="0" smtClean="0"/>
-            <a:t/>
-          </a:r>
           <a:br>
             <a:rPr lang="en-US" sz="1400" b="1" dirty="0" smtClean="0"/>
           </a:br>
           <a:r>
             <a:rPr lang="en-US" sz="1400" b="1" dirty="0" smtClean="0"/>
-            <a:t> Main the basic client + server</a:t>
+            <a:t>Sensor  registration part.</a:t>
           </a:r>
+          <a:endParaRPr lang="en-US" sz="1400" b="1" dirty="0" smtClean="0"/>
         </a:p>
       </dgm:t>
     </dgm:pt>
@@ -927,14 +929,14 @@
             <a:rPr lang="en-US" b="1" dirty="0" smtClean="0"/>
             <a:t>Week9</a:t>
           </a:r>
-          <a:endParaRPr lang="en-US" b="1" dirty="0" smtClean="0"/>
         </a:p>
         <a:p>
           <a:pPr algn="l"/>
           <a:r>
             <a:rPr lang="en-US" b="1" dirty="0" smtClean="0"/>
-            <a:t>DB + Optimize code+ comm </a:t>
+            <a:t>Demo + OPTEE setup  </a:t>
           </a:r>
+          <a:endParaRPr lang="en-US" b="1" dirty="0" smtClean="0"/>
         </a:p>
       </dgm:t>
     </dgm:pt>
@@ -1007,7 +1009,7 @@
       <dgm:spPr/>
     </dgm:pt>
     <dgm:pt modelId="{7A501153-4739-42BE-9999-8D76E5F449A3}" type="pres">
-      <dgm:prSet presAssocID="{4CE292AE-8D23-4253-8B06-6B7C354F3CD3}" presName="parTxOnly" presStyleLbl="node1" presStyleIdx="0" presStyleCnt="3" custScaleY="46117">
+      <dgm:prSet presAssocID="{4CE292AE-8D23-4253-8B06-6B7C354F3CD3}" presName="parTxOnly" presStyleLbl="node1" presStyleIdx="0" presStyleCnt="3" custScaleY="46117" custLinFactNeighborX="-7020">
         <dgm:presLayoutVars>
           <dgm:bulletEnabled val="1"/>
         </dgm:presLayoutVars>
@@ -1061,13 +1063,13 @@
     </dgm:pt>
   </dgm:ptLst>
   <dgm:cxnLst>
+    <dgm:cxn modelId="{B7C36CB7-444D-45E1-A15D-8545DD32AF9D}" srcId="{2165A30D-AF24-4617-91DA-51B52B9BE7AF}" destId="{94375D91-6FAA-4095-8B34-4B01C1CCA488}" srcOrd="1" destOrd="0" parTransId="{BB8ABCE2-65E7-4582-99E9-364AE102340F}" sibTransId="{DC90412E-975F-407A-A04C-6A18378C29AC}"/>
+    <dgm:cxn modelId="{8F0A8B50-4981-435B-9EF5-2B6E7D0CB5FE}" type="presOf" srcId="{2165A30D-AF24-4617-91DA-51B52B9BE7AF}" destId="{5F7C24BC-EFB7-4C08-BE39-3854452DC3AA}" srcOrd="0" destOrd="0" presId="urn:microsoft.com/office/officeart/2005/8/layout/hChevron3"/>
+    <dgm:cxn modelId="{FBE2C0D4-E5B6-4DFD-A4F0-3857ACEA08B4}" type="presOf" srcId="{94375D91-6FAA-4095-8B34-4B01C1CCA488}" destId="{09078936-657C-4570-81A2-333A05E4079D}" srcOrd="0" destOrd="0" presId="urn:microsoft.com/office/officeart/2005/8/layout/hChevron3"/>
+    <dgm:cxn modelId="{4B15F221-BAF7-454D-8006-42C0EB6943D0}" type="presOf" srcId="{4CE292AE-8D23-4253-8B06-6B7C354F3CD3}" destId="{7A501153-4739-42BE-9999-8D76E5F449A3}" srcOrd="0" destOrd="0" presId="urn:microsoft.com/office/officeart/2005/8/layout/hChevron3"/>
+    <dgm:cxn modelId="{D50ED5D3-B163-4B11-98FB-C0CEE7AB71EE}" srcId="{2165A30D-AF24-4617-91DA-51B52B9BE7AF}" destId="{4CE292AE-8D23-4253-8B06-6B7C354F3CD3}" srcOrd="0" destOrd="0" parTransId="{E7EABD9C-A712-44F9-838B-752822E908F1}" sibTransId="{004DB15D-F506-472D-89C9-A1028216B1D8}"/>
+    <dgm:cxn modelId="{BFD8AEE0-D0E9-4BBB-851D-A426A90FC243}" srcId="{2165A30D-AF24-4617-91DA-51B52B9BE7AF}" destId="{51EDCF2D-2C1B-45C0-9FA8-776439DC02A3}" srcOrd="2" destOrd="0" parTransId="{14F8677F-C7BE-4532-B019-76CB3061F74A}" sibTransId="{75AC053F-2AAF-41AC-81EA-3D7F9F9C10D4}"/>
     <dgm:cxn modelId="{703B2FFF-AB2F-455B-9034-8F1BB9B60B78}" type="presOf" srcId="{51EDCF2D-2C1B-45C0-9FA8-776439DC02A3}" destId="{79FE03FA-5146-4E59-BC7C-1FB306C0EE3F}" srcOrd="0" destOrd="0" presId="urn:microsoft.com/office/officeart/2005/8/layout/hChevron3"/>
-    <dgm:cxn modelId="{4B15F221-BAF7-454D-8006-42C0EB6943D0}" type="presOf" srcId="{4CE292AE-8D23-4253-8B06-6B7C354F3CD3}" destId="{7A501153-4739-42BE-9999-8D76E5F449A3}" srcOrd="0" destOrd="0" presId="urn:microsoft.com/office/officeart/2005/8/layout/hChevron3"/>
-    <dgm:cxn modelId="{8F0A8B50-4981-435B-9EF5-2B6E7D0CB5FE}" type="presOf" srcId="{2165A30D-AF24-4617-91DA-51B52B9BE7AF}" destId="{5F7C24BC-EFB7-4C08-BE39-3854452DC3AA}" srcOrd="0" destOrd="0" presId="urn:microsoft.com/office/officeart/2005/8/layout/hChevron3"/>
-    <dgm:cxn modelId="{BFD8AEE0-D0E9-4BBB-851D-A426A90FC243}" srcId="{2165A30D-AF24-4617-91DA-51B52B9BE7AF}" destId="{51EDCF2D-2C1B-45C0-9FA8-776439DC02A3}" srcOrd="2" destOrd="0" parTransId="{14F8677F-C7BE-4532-B019-76CB3061F74A}" sibTransId="{75AC053F-2AAF-41AC-81EA-3D7F9F9C10D4}"/>
-    <dgm:cxn modelId="{D50ED5D3-B163-4B11-98FB-C0CEE7AB71EE}" srcId="{2165A30D-AF24-4617-91DA-51B52B9BE7AF}" destId="{4CE292AE-8D23-4253-8B06-6B7C354F3CD3}" srcOrd="0" destOrd="0" parTransId="{E7EABD9C-A712-44F9-838B-752822E908F1}" sibTransId="{004DB15D-F506-472D-89C9-A1028216B1D8}"/>
-    <dgm:cxn modelId="{FBE2C0D4-E5B6-4DFD-A4F0-3857ACEA08B4}" type="presOf" srcId="{94375D91-6FAA-4095-8B34-4B01C1CCA488}" destId="{09078936-657C-4570-81A2-333A05E4079D}" srcOrd="0" destOrd="0" presId="urn:microsoft.com/office/officeart/2005/8/layout/hChevron3"/>
-    <dgm:cxn modelId="{B7C36CB7-444D-45E1-A15D-8545DD32AF9D}" srcId="{2165A30D-AF24-4617-91DA-51B52B9BE7AF}" destId="{94375D91-6FAA-4095-8B34-4B01C1CCA488}" srcOrd="1" destOrd="0" parTransId="{BB8ABCE2-65E7-4582-99E9-364AE102340F}" sibTransId="{DC90412E-975F-407A-A04C-6A18378C29AC}"/>
     <dgm:cxn modelId="{D9E9C981-1670-4BD6-8F4E-D3EBB32A93C8}" type="presParOf" srcId="{5F7C24BC-EFB7-4C08-BE39-3854452DC3AA}" destId="{7A501153-4739-42BE-9999-8D76E5F449A3}" srcOrd="0" destOrd="0" presId="urn:microsoft.com/office/officeart/2005/8/layout/hChevron3"/>
     <dgm:cxn modelId="{4FF6BF06-0FA6-42B9-AC00-7C62CB243B5B}" type="presParOf" srcId="{5F7C24BC-EFB7-4C08-BE39-3854452DC3AA}" destId="{5A3EF958-17E8-4DCE-810A-0442885AD282}" srcOrd="1" destOrd="0" presId="urn:microsoft.com/office/officeart/2005/8/layout/hChevron3"/>
     <dgm:cxn modelId="{6FF21D0C-974D-482C-8971-36EF0EFF99FF}" type="presParOf" srcId="{5F7C24BC-EFB7-4C08-BE39-3854452DC3AA}" destId="{09078936-657C-4570-81A2-333A05E4079D}" srcOrd="2" destOrd="0" presId="urn:microsoft.com/office/officeart/2005/8/layout/hChevron3"/>
@@ -1099,7 +1101,7 @@
       </dsp:nvSpPr>
       <dsp:spPr>
         <a:xfrm>
-          <a:off x="3464" y="1011193"/>
+          <a:off x="0" y="1011193"/>
           <a:ext cx="3029271" cy="558803"/>
         </a:xfrm>
         <a:prstGeom prst="homePlate">
@@ -1162,21 +1164,18 @@
             <a:rPr lang="en-US" sz="1400" b="1" kern="1200" dirty="0" smtClean="0"/>
             <a:t>Week8</a:t>
           </a:r>
-          <a:r>
-            <a:rPr lang="en-US" sz="1400" b="1" kern="1200" dirty="0" smtClean="0"/>
-            <a:t/>
-          </a:r>
           <a:br>
             <a:rPr lang="en-US" sz="1400" b="1" kern="1200" dirty="0" smtClean="0"/>
           </a:br>
           <a:r>
             <a:rPr lang="en-US" sz="1400" b="1" kern="1200" dirty="0" smtClean="0"/>
-            <a:t> Main the basic client + server</a:t>
+            <a:t>Sensor  registration part.</a:t>
           </a:r>
+          <a:endParaRPr lang="en-US" sz="1400" b="1" kern="1200" dirty="0" smtClean="0"/>
         </a:p>
       </dsp:txBody>
       <dsp:txXfrm>
-        <a:off x="3464" y="1011193"/>
+        <a:off x="0" y="1011193"/>
         <a:ext cx="2889570" cy="558803"/>
       </dsp:txXfrm>
     </dsp:sp>
@@ -1250,7 +1249,6 @@
             <a:rPr lang="en-US" sz="1400" b="1" kern="1200" dirty="0" smtClean="0"/>
             <a:t>Week9</a:t>
           </a:r>
-          <a:endParaRPr lang="en-US" sz="1400" b="1" kern="1200" dirty="0" smtClean="0"/>
         </a:p>
         <a:p>
           <a:pPr lvl="0" algn="l" defTabSz="622300">
@@ -1266,8 +1264,9 @@
           </a:pPr>
           <a:r>
             <a:rPr lang="en-US" sz="1400" b="1" kern="1200" dirty="0" smtClean="0"/>
-            <a:t>DB + Optimize code+ comm </a:t>
+            <a:t>Demo + OPTEE setup  </a:t>
           </a:r>
+          <a:endParaRPr lang="en-US" sz="1400" b="1" kern="1200" dirty="0" smtClean="0"/>
         </a:p>
       </dsp:txBody>
       <dsp:txXfrm>
@@ -6413,15 +6412,6 @@
               </a:rPr>
               <a:t>IOT Project Progress Report</a:t>
             </a:r>
-            <a:endParaRPr lang="en-US" altLang="zh-CN" sz="2000" b="1" dirty="0">
-              <a:solidFill>
-                <a:prstClr val="white">
-                  <a:lumMod val="95000"/>
-                </a:prstClr>
-              </a:solidFill>
-              <a:latin typeface="微软雅黑" panose="020B0503020204020204" pitchFamily="34" charset="-122"/>
-              <a:ea typeface="微软雅黑" panose="020B0503020204020204" pitchFamily="34" charset="-122"/>
-            </a:endParaRPr>
           </a:p>
         </p:txBody>
       </p:sp>
@@ -6697,23 +6687,7 @@
                             <a:schemeClr val="tx2"/>
                           </a:solidFill>
                         </a:rPr>
-                        <a:t>OpenSSL </a:t>
-                      </a:r>
-                      <a:r>
-                        <a:rPr lang="en-US" sz="1200" b="1" dirty="0" smtClean="0">
-                          <a:solidFill>
-                            <a:schemeClr val="tx2"/>
-                          </a:solidFill>
-                        </a:rPr>
-                        <a:t>client </a:t>
-                      </a:r>
-                      <a:r>
-                        <a:rPr lang="en-US" sz="1200" b="1" dirty="0" smtClean="0">
-                          <a:solidFill>
-                            <a:schemeClr val="tx2"/>
-                          </a:solidFill>
-                        </a:rPr>
-                        <a:t>setup</a:t>
+                        <a:t>OpenSSL client setup</a:t>
                       </a:r>
                     </a:p>
                   </a:txBody>
@@ -6997,11 +6971,7 @@
                       </a:r>
                       <a:r>
                         <a:rPr lang="en-US" baseline="0" dirty="0" smtClean="0"/>
-                        <a:t> </a:t>
-                      </a:r>
-                      <a:r>
-                        <a:rPr lang="en-US" baseline="0" dirty="0" smtClean="0"/>
-                        <a:t>Server </a:t>
+                        <a:t> Server </a:t>
                       </a:r>
                       <a:endParaRPr lang="en-US" dirty="0"/>
                     </a:p>
@@ -7358,15 +7328,6 @@
               </a:rPr>
               <a:t>IOT Project Progress Report</a:t>
             </a:r>
-            <a:endParaRPr lang="en-US" altLang="zh-CN" sz="2000" b="1" dirty="0">
-              <a:solidFill>
-                <a:prstClr val="white">
-                  <a:lumMod val="95000"/>
-                </a:prstClr>
-              </a:solidFill>
-              <a:latin typeface="微软雅黑" panose="020B0503020204020204" pitchFamily="34" charset="-122"/>
-              <a:ea typeface="微软雅黑" panose="020B0503020204020204" pitchFamily="34" charset="-122"/>
-            </a:endParaRPr>
           </a:p>
         </p:txBody>
       </p:sp>
@@ -7850,15 +7811,6 @@
               </a:rPr>
               <a:t>IOT Project Progress Report</a:t>
             </a:r>
-            <a:endParaRPr lang="en-US" altLang="zh-CN" sz="2000" b="1" dirty="0">
-              <a:solidFill>
-                <a:prstClr val="white">
-                  <a:lumMod val="95000"/>
-                </a:prstClr>
-              </a:solidFill>
-              <a:latin typeface="微软雅黑" panose="020B0503020204020204" pitchFamily="34" charset="-122"/>
-              <a:ea typeface="微软雅黑" panose="020B0503020204020204" pitchFamily="34" charset="-122"/>
-            </a:endParaRPr>
           </a:p>
         </p:txBody>
       </p:sp>
@@ -8006,15 +7958,7 @@
             </a:r>
             <a:r>
               <a:rPr lang="en-US" b="1" dirty="0" smtClean="0"/>
-              <a:t> part[</a:t>
-            </a:r>
-            <a:r>
-              <a:rPr lang="en-US" b="1" dirty="0" smtClean="0"/>
-              <a:t>Raspberry </a:t>
-            </a:r>
-            <a:r>
-              <a:rPr lang="en-US" b="1" dirty="0" smtClean="0"/>
-              <a:t>]:</a:t>
+              <a:t> part[Raspberry ]:</a:t>
             </a:r>
             <a:endParaRPr lang="en-SG" b="1" dirty="0"/>
           </a:p>
@@ -8480,15 +8424,6 @@
               </a:rPr>
               <a:t>IOT Project Progress Report</a:t>
             </a:r>
-            <a:endParaRPr lang="en-US" altLang="zh-CN" sz="2000" b="1" dirty="0">
-              <a:solidFill>
-                <a:prstClr val="white">
-                  <a:lumMod val="95000"/>
-                </a:prstClr>
-              </a:solidFill>
-              <a:latin typeface="微软雅黑" panose="020B0503020204020204" pitchFamily="34" charset="-122"/>
-              <a:ea typeface="微软雅黑" panose="020B0503020204020204" pitchFamily="34" charset="-122"/>
-            </a:endParaRPr>
           </a:p>
         </p:txBody>
       </p:sp>
@@ -8632,15 +8567,7 @@
                   <a:schemeClr val="tx2"/>
                 </a:solidFill>
               </a:rPr>
-              <a:t>Project </a:t>
-            </a:r>
-            <a:r>
-              <a:rPr lang="en-US" b="1" dirty="0">
-                <a:solidFill>
-                  <a:schemeClr val="tx2"/>
-                </a:solidFill>
-              </a:rPr>
-              <a:t>TimeLine:</a:t>
+              <a:t>Project TimeLine:</a:t>
             </a:r>
             <a:endParaRPr lang="en-US" dirty="0"/>
           </a:p>
@@ -8653,7 +8580,7 @@
           <p:nvPr>
             <p:extLst>
               <p:ext uri="{D42A27DB-BD31-4B8C-83A1-F6EECF244321}">
-                <p14:modId xmlns:p14="http://schemas.microsoft.com/office/powerpoint/2010/main" val="375173875"/>
+                <p14:modId xmlns:p14="http://schemas.microsoft.com/office/powerpoint/2010/main" val="1900833969"/>
               </p:ext>
             </p:extLst>
           </p:nvPr>
@@ -8742,7 +8669,7 @@
         <p:spPr>
           <a:xfrm>
             <a:off x="4379243" y="2719085"/>
-            <a:ext cx="2330369" cy="1169551"/>
+            <a:ext cx="2330369" cy="1600438"/>
           </a:xfrm>
           <a:prstGeom prst="rect">
             <a:avLst/>
@@ -8779,8 +8706,29 @@
                   <a:schemeClr val="tx2"/>
                 </a:solidFill>
               </a:rPr>
-              <a:t>Sensor auto-detection function . </a:t>
-            </a:r>
+              <a:t>Sensor auto-detection function </a:t>
+            </a:r>
+            <a:r>
+              <a:rPr lang="en-US" sz="1400" b="1" dirty="0" smtClean="0">
+                <a:solidFill>
+                  <a:schemeClr val="tx2"/>
+                </a:solidFill>
+              </a:rPr>
+              <a:t>and signature simulation part for demo</a:t>
+            </a:r>
+            <a:r>
+              <a:rPr lang="en-US" sz="1400" b="1" dirty="0" smtClean="0">
+                <a:solidFill>
+                  <a:schemeClr val="tx2"/>
+                </a:solidFill>
+              </a:rPr>
+              <a:t>. </a:t>
+            </a:r>
+            <a:endParaRPr lang="en-US" sz="1400" b="1" dirty="0" smtClean="0">
+              <a:solidFill>
+                <a:schemeClr val="tx2"/>
+              </a:solidFill>
+            </a:endParaRPr>
           </a:p>
           <a:p>
             <a:pPr marL="285750" indent="-285750">

</xml_diff>